<commit_message>
Lecture 11 removed. Adjusted Lecture 01
</commit_message>
<xml_diff>
--- a/DigitalSystems/Lecture10/pictures/pictures-converted.pptx
+++ b/DigitalSystems/Lecture10/pictures/pictures-converted.pptx
@@ -3037,25 +3037,6 @@
       </p:grpSpPr>
       <p:sp>
         <p:nvSpPr>
-          <p:cNvPr id="2" name="Title 1"/>
-          <p:cNvSpPr>
-            <a:spLocks noGrp="1"/>
-          </p:cNvSpPr>
-          <p:nvPr>
-            <p:ph type="ctrTitle"/>
-          </p:nvPr>
-        </p:nvSpPr>
-        <p:spPr/>
-        <p:txBody>
-          <a:bodyPr/>
-          <a:lstStyle/>
-          <a:p>
-            <a:endParaRPr lang="en-US" dirty="0"/>
-          </a:p>
-        </p:txBody>
-      </p:sp>
-      <p:sp>
-        <p:nvSpPr>
           <p:cNvPr id="3" name="Subtitle 2"/>
           <p:cNvSpPr>
             <a:spLocks noGrp="1"/>
@@ -3064,12 +3045,33 @@
             <p:ph type="subTitle" idx="1"/>
           </p:nvPr>
         </p:nvSpPr>
-        <p:spPr/>
-        <p:txBody>
-          <a:bodyPr/>
-          <a:lstStyle/>
-          <a:p>
-            <a:endParaRPr lang="en-US" dirty="0"/>
+        <p:spPr>
+          <a:xfrm>
+            <a:off x="4783726" y="3741916"/>
+            <a:ext cx="312484" cy="401983"/>
+          </a:xfrm>
+        </p:spPr>
+        <p:txBody>
+          <a:bodyPr>
+            <a:normAutofit/>
+          </a:bodyPr>
+          <a:lstStyle/>
+          <a:p>
+            <a:r>
+              <a:rPr lang="en-US" sz="1800" dirty="0" err="1" smtClean="0">
+                <a:solidFill>
+                  <a:schemeClr val="tx1"/>
+                </a:solidFill>
+                <a:latin typeface="Symbol"/>
+              </a:rPr>
+              <a:t>ε</a:t>
+            </a:r>
+            <a:endParaRPr lang="en-US" sz="1800" dirty="0">
+              <a:solidFill>
+                <a:schemeClr val="tx1"/>
+              </a:solidFill>
+              <a:latin typeface="Symbol"/>
+            </a:endParaRPr>
           </a:p>
         </p:txBody>
       </p:sp>
@@ -3101,7 +3103,7 @@
         </mc:AlternateContent>
         <p:spPr>
           <a:xfrm>
-            <a:off x="3231148" y="1373779"/>
+            <a:off x="435373" y="395832"/>
             <a:ext cx="2120900" cy="419100"/>
           </a:xfrm>
           <a:prstGeom prst="rect">
@@ -3117,7 +3119,7 @@
         </p:nvSpPr>
         <p:spPr>
           <a:xfrm>
-            <a:off x="4438623" y="1390559"/>
+            <a:off x="1642848" y="412612"/>
             <a:ext cx="349224" cy="369332"/>
           </a:xfrm>
           <a:prstGeom prst="rect">
@@ -3151,8 +3153,8 @@
         </p:nvSpPr>
         <p:spPr>
           <a:xfrm>
-            <a:off x="4911926" y="1269658"/>
-            <a:ext cx="312656" cy="307777"/>
+            <a:off x="2124398" y="316452"/>
+            <a:ext cx="294371" cy="276999"/>
           </a:xfrm>
           <a:prstGeom prst="rect">
             <a:avLst/>
@@ -3166,12 +3168,12 @@
           <a:lstStyle/>
           <a:p>
             <a:r>
-              <a:rPr lang="en-US" sz="1400" dirty="0" smtClean="0">
+              <a:rPr lang="en-US" sz="1200" dirty="0" smtClean="0">
                 <a:latin typeface="Symbol"/>
               </a:rPr>
               <a:t>∇</a:t>
             </a:r>
-            <a:endParaRPr lang="en-US" sz="1400" dirty="0">
+            <a:endParaRPr lang="en-US" sz="1200" dirty="0">
               <a:latin typeface="Symbol"/>
             </a:endParaRPr>
           </a:p>
@@ -3205,7 +3207,7 @@
         </mc:AlternateContent>
         <p:spPr>
           <a:xfrm>
-            <a:off x="3511550" y="3219450"/>
+            <a:off x="3095435" y="412612"/>
             <a:ext cx="2120900" cy="419100"/>
           </a:xfrm>
           <a:prstGeom prst="rect">
@@ -3221,7 +3223,7 @@
         </p:nvSpPr>
         <p:spPr>
           <a:xfrm>
-            <a:off x="5216335" y="3137717"/>
+            <a:off x="4816714" y="330879"/>
             <a:ext cx="294371" cy="276999"/>
           </a:xfrm>
           <a:prstGeom prst="rect">
@@ -3242,6 +3244,564 @@
               <a:t>∇</a:t>
             </a:r>
             <a:endParaRPr lang="en-US" sz="1200" dirty="0">
+              <a:latin typeface="Symbol"/>
+            </a:endParaRPr>
+          </a:p>
+        </p:txBody>
+      </p:sp>
+      <p:pic>
+        <p:nvPicPr>
+          <p:cNvPr id="9" name="Picture 8" descr="cse3.eps"/>
+          <p:cNvPicPr>
+            <a:picLocks noChangeAspect="1"/>
+          </p:cNvPicPr>
+          <p:nvPr/>
+        </p:nvPicPr>
+        <mc:AlternateContent>
+          <mc:Choice xmlns:ma="http://schemas.microsoft.com/office/mac/drawingml/2008/main" Requires="ma">
+            <p:blipFill>
+              <a:blip r:embed="rId6"/>
+              <a:stretch>
+                <a:fillRect/>
+              </a:stretch>
+            </p:blipFill>
+          </mc:Choice>
+          <mc:Fallback>
+            <p:blipFill>
+              <a:blip r:embed="rId7"/>
+              <a:stretch>
+                <a:fillRect/>
+              </a:stretch>
+            </p:blipFill>
+          </mc:Fallback>
+        </mc:AlternateContent>
+        <p:spPr>
+          <a:xfrm>
+            <a:off x="5461000" y="421232"/>
+            <a:ext cx="2311400" cy="393700"/>
+          </a:xfrm>
+          <a:prstGeom prst="rect">
+            <a:avLst/>
+          </a:prstGeom>
+        </p:spPr>
+      </p:pic>
+      <p:sp>
+        <p:nvSpPr>
+          <p:cNvPr id="10" name="TextBox 9"/>
+          <p:cNvSpPr txBox="1"/>
+          <p:nvPr/>
+        </p:nvSpPr>
+        <p:spPr>
+          <a:xfrm>
+            <a:off x="6713160" y="347373"/>
+            <a:ext cx="261610" cy="276999"/>
+          </a:xfrm>
+          <a:prstGeom prst="rect">
+            <a:avLst/>
+          </a:prstGeom>
+          <a:noFill/>
+        </p:spPr>
+        <p:txBody>
+          <a:bodyPr wrap="none" rtlCol="0">
+            <a:spAutoFit/>
+          </a:bodyPr>
+          <a:lstStyle/>
+          <a:p>
+            <a:r>
+              <a:rPr lang="en-US" sz="1200" dirty="0" smtClean="0">
+                <a:latin typeface="Symbol"/>
+              </a:rPr>
+              <a:t>-</a:t>
+            </a:r>
+            <a:endParaRPr lang="en-US" sz="1200" dirty="0">
+              <a:latin typeface="Symbol"/>
+            </a:endParaRPr>
+          </a:p>
+        </p:txBody>
+      </p:sp>
+      <p:sp>
+        <p:nvSpPr>
+          <p:cNvPr id="11" name="TextBox 10"/>
+          <p:cNvSpPr txBox="1"/>
+          <p:nvPr/>
+        </p:nvSpPr>
+        <p:spPr>
+          <a:xfrm>
+            <a:off x="7412053" y="339126"/>
+            <a:ext cx="294371" cy="276999"/>
+          </a:xfrm>
+          <a:prstGeom prst="rect">
+            <a:avLst/>
+          </a:prstGeom>
+          <a:noFill/>
+        </p:spPr>
+        <p:txBody>
+          <a:bodyPr wrap="none" rtlCol="0">
+            <a:spAutoFit/>
+          </a:bodyPr>
+          <a:lstStyle/>
+          <a:p>
+            <a:r>
+              <a:rPr lang="en-US" sz="1200" dirty="0" smtClean="0">
+                <a:latin typeface="Symbol"/>
+              </a:rPr>
+              <a:t>∇</a:t>
+            </a:r>
+            <a:endParaRPr lang="en-US" sz="1200" dirty="0">
+              <a:latin typeface="Symbol"/>
+            </a:endParaRPr>
+          </a:p>
+        </p:txBody>
+      </p:sp>
+      <p:pic>
+        <p:nvPicPr>
+          <p:cNvPr id="12" name="Picture 11" descr="cse4.eps"/>
+          <p:cNvPicPr>
+            <a:picLocks noChangeAspect="1"/>
+          </p:cNvPicPr>
+          <p:nvPr/>
+        </p:nvPicPr>
+        <mc:AlternateContent>
+          <mc:Choice xmlns:ma="http://schemas.microsoft.com/office/mac/drawingml/2008/main" Requires="ma">
+            <p:blipFill>
+              <a:blip r:embed="rId8"/>
+              <a:stretch>
+                <a:fillRect/>
+              </a:stretch>
+            </p:blipFill>
+          </mc:Choice>
+          <mc:Fallback>
+            <p:blipFill>
+              <a:blip r:embed="rId9"/>
+              <a:stretch>
+                <a:fillRect/>
+              </a:stretch>
+            </p:blipFill>
+          </mc:Fallback>
+        </mc:AlternateContent>
+        <p:spPr>
+          <a:xfrm>
+            <a:off x="435373" y="1352427"/>
+            <a:ext cx="2159000" cy="393700"/>
+          </a:xfrm>
+          <a:prstGeom prst="rect">
+            <a:avLst/>
+          </a:prstGeom>
+        </p:spPr>
+      </p:pic>
+      <p:sp>
+        <p:nvSpPr>
+          <p:cNvPr id="13" name="TextBox 12"/>
+          <p:cNvSpPr txBox="1"/>
+          <p:nvPr/>
+        </p:nvSpPr>
+        <p:spPr>
+          <a:xfrm>
+            <a:off x="1684083" y="1278204"/>
+            <a:ext cx="261610" cy="276999"/>
+          </a:xfrm>
+          <a:prstGeom prst="rect">
+            <a:avLst/>
+          </a:prstGeom>
+          <a:noFill/>
+        </p:spPr>
+        <p:txBody>
+          <a:bodyPr wrap="none" rtlCol="0">
+            <a:spAutoFit/>
+          </a:bodyPr>
+          <a:lstStyle/>
+          <a:p>
+            <a:r>
+              <a:rPr lang="en-US" sz="1200" dirty="0" smtClean="0">
+                <a:latin typeface="Symbol"/>
+              </a:rPr>
+              <a:t>-</a:t>
+            </a:r>
+            <a:endParaRPr lang="en-US" sz="1200" dirty="0">
+              <a:latin typeface="Symbol"/>
+            </a:endParaRPr>
+          </a:p>
+        </p:txBody>
+      </p:sp>
+      <p:sp>
+        <p:nvSpPr>
+          <p:cNvPr id="14" name="TextBox 13"/>
+          <p:cNvSpPr txBox="1"/>
+          <p:nvPr/>
+        </p:nvSpPr>
+        <p:spPr>
+          <a:xfrm>
+            <a:off x="2286643" y="1278204"/>
+            <a:ext cx="294371" cy="276999"/>
+          </a:xfrm>
+          <a:prstGeom prst="rect">
+            <a:avLst/>
+          </a:prstGeom>
+          <a:noFill/>
+        </p:spPr>
+        <p:txBody>
+          <a:bodyPr wrap="none" rtlCol="0">
+            <a:spAutoFit/>
+          </a:bodyPr>
+          <a:lstStyle/>
+          <a:p>
+            <a:r>
+              <a:rPr lang="en-US" sz="1200" dirty="0" smtClean="0">
+                <a:latin typeface="Symbol"/>
+              </a:rPr>
+              <a:t>∇</a:t>
+            </a:r>
+            <a:endParaRPr lang="en-US" sz="1200" dirty="0">
+              <a:latin typeface="Symbol"/>
+            </a:endParaRPr>
+          </a:p>
+        </p:txBody>
+      </p:sp>
+      <p:sp>
+        <p:nvSpPr>
+          <p:cNvPr id="15" name="TextBox 14"/>
+          <p:cNvSpPr txBox="1"/>
+          <p:nvPr/>
+        </p:nvSpPr>
+        <p:spPr>
+          <a:xfrm>
+            <a:off x="1053018" y="1339887"/>
+            <a:ext cx="248786" cy="230832"/>
+          </a:xfrm>
+          <a:prstGeom prst="rect">
+            <a:avLst/>
+          </a:prstGeom>
+          <a:noFill/>
+        </p:spPr>
+        <p:txBody>
+          <a:bodyPr wrap="none" rtlCol="0">
+            <a:spAutoFit/>
+          </a:bodyPr>
+          <a:lstStyle/>
+          <a:p>
+            <a:r>
+              <a:rPr lang="en-US" sz="900" dirty="0" smtClean="0">
+                <a:latin typeface="Symbol"/>
+              </a:rPr>
+              <a:t>-</a:t>
+            </a:r>
+            <a:endParaRPr lang="en-US" sz="900" dirty="0">
+              <a:latin typeface="Symbol"/>
+            </a:endParaRPr>
+          </a:p>
+        </p:txBody>
+      </p:sp>
+      <p:pic>
+        <p:nvPicPr>
+          <p:cNvPr id="16" name="Picture 15" descr="gate.eps"/>
+          <p:cNvPicPr>
+            <a:picLocks noChangeAspect="1"/>
+          </p:cNvPicPr>
+          <p:nvPr/>
+        </p:nvPicPr>
+        <mc:AlternateContent>
+          <mc:Choice xmlns:ma="http://schemas.microsoft.com/office/mac/drawingml/2008/main" Requires="ma">
+            <p:blipFill>
+              <a:blip r:embed="rId10"/>
+              <a:stretch>
+                <a:fillRect/>
+              </a:stretch>
+            </p:blipFill>
+          </mc:Choice>
+          <mc:Fallback>
+            <p:blipFill>
+              <a:blip r:embed="rId11"/>
+              <a:stretch>
+                <a:fillRect/>
+              </a:stretch>
+            </p:blipFill>
+          </mc:Fallback>
+        </mc:AlternateContent>
+        <p:spPr>
+          <a:xfrm>
+            <a:off x="1263650" y="2222405"/>
+            <a:ext cx="6616700" cy="1905000"/>
+          </a:xfrm>
+          <a:prstGeom prst="rect">
+            <a:avLst/>
+          </a:prstGeom>
+        </p:spPr>
+      </p:pic>
+      <p:sp>
+        <p:nvSpPr>
+          <p:cNvPr id="17" name="TextBox 16"/>
+          <p:cNvSpPr txBox="1"/>
+          <p:nvPr/>
+        </p:nvSpPr>
+        <p:spPr>
+          <a:xfrm>
+            <a:off x="3177905" y="2156429"/>
+            <a:ext cx="300082" cy="369332"/>
+          </a:xfrm>
+          <a:prstGeom prst="rect">
+            <a:avLst/>
+          </a:prstGeom>
+          <a:noFill/>
+        </p:spPr>
+        <p:txBody>
+          <a:bodyPr wrap="none" rtlCol="0">
+            <a:spAutoFit/>
+          </a:bodyPr>
+          <a:lstStyle/>
+          <a:p>
+            <a:r>
+              <a:rPr lang="en-US" dirty="0" smtClean="0">
+                <a:latin typeface="Symbol"/>
+              </a:rPr>
+              <a:t>-</a:t>
+            </a:r>
+            <a:endParaRPr lang="en-US" dirty="0">
+              <a:latin typeface="Symbol"/>
+            </a:endParaRPr>
+          </a:p>
+        </p:txBody>
+      </p:sp>
+      <p:sp>
+        <p:nvSpPr>
+          <p:cNvPr id="18" name="TextBox 17"/>
+          <p:cNvSpPr txBox="1"/>
+          <p:nvPr/>
+        </p:nvSpPr>
+        <p:spPr>
+          <a:xfrm>
+            <a:off x="4182058" y="2869783"/>
+            <a:ext cx="300082" cy="369332"/>
+          </a:xfrm>
+          <a:prstGeom prst="rect">
+            <a:avLst/>
+          </a:prstGeom>
+          <a:noFill/>
+        </p:spPr>
+        <p:txBody>
+          <a:bodyPr wrap="none" rtlCol="0">
+            <a:spAutoFit/>
+          </a:bodyPr>
+          <a:lstStyle/>
+          <a:p>
+            <a:r>
+              <a:rPr lang="en-US" dirty="0" smtClean="0">
+                <a:latin typeface="Symbol"/>
+              </a:rPr>
+              <a:t>-</a:t>
+            </a:r>
+            <a:endParaRPr lang="en-US" dirty="0">
+              <a:latin typeface="Symbol"/>
+            </a:endParaRPr>
+          </a:p>
+        </p:txBody>
+      </p:sp>
+      <p:sp>
+        <p:nvSpPr>
+          <p:cNvPr id="19" name="TextBox 18"/>
+          <p:cNvSpPr txBox="1"/>
+          <p:nvPr/>
+        </p:nvSpPr>
+        <p:spPr>
+          <a:xfrm>
+            <a:off x="5144424" y="3776050"/>
+            <a:ext cx="300082" cy="369332"/>
+          </a:xfrm>
+          <a:prstGeom prst="rect">
+            <a:avLst/>
+          </a:prstGeom>
+          <a:noFill/>
+        </p:spPr>
+        <p:txBody>
+          <a:bodyPr wrap="none" rtlCol="0">
+            <a:spAutoFit/>
+          </a:bodyPr>
+          <a:lstStyle/>
+          <a:p>
+            <a:r>
+              <a:rPr lang="en-US" dirty="0" smtClean="0">
+                <a:latin typeface="Symbol"/>
+              </a:rPr>
+              <a:t>-</a:t>
+            </a:r>
+            <a:endParaRPr lang="en-US" dirty="0">
+              <a:latin typeface="Symbol"/>
+            </a:endParaRPr>
+          </a:p>
+        </p:txBody>
+      </p:sp>
+      <p:sp>
+        <p:nvSpPr>
+          <p:cNvPr id="20" name="TextBox 19"/>
+          <p:cNvSpPr txBox="1"/>
+          <p:nvPr/>
+        </p:nvSpPr>
+        <p:spPr>
+          <a:xfrm>
+            <a:off x="5504759" y="3783394"/>
+            <a:ext cx="300082" cy="369332"/>
+          </a:xfrm>
+          <a:prstGeom prst="rect">
+            <a:avLst/>
+          </a:prstGeom>
+          <a:noFill/>
+        </p:spPr>
+        <p:txBody>
+          <a:bodyPr wrap="none" rtlCol="0">
+            <a:spAutoFit/>
+          </a:bodyPr>
+          <a:lstStyle/>
+          <a:p>
+            <a:r>
+              <a:rPr lang="en-US" dirty="0" smtClean="0">
+                <a:latin typeface="Symbol"/>
+              </a:rPr>
+              <a:t>-</a:t>
+            </a:r>
+            <a:endParaRPr lang="en-US" dirty="0">
+              <a:latin typeface="Symbol"/>
+            </a:endParaRPr>
+          </a:p>
+        </p:txBody>
+      </p:sp>
+      <p:sp>
+        <p:nvSpPr>
+          <p:cNvPr id="22" name="Subtitle 2"/>
+          <p:cNvSpPr txBox="1">
+            <a:spLocks/>
+          </p:cNvSpPr>
+          <p:nvPr/>
+        </p:nvSpPr>
+        <p:spPr>
+          <a:xfrm>
+            <a:off x="2832433" y="2115194"/>
+            <a:ext cx="312484" cy="401983"/>
+          </a:xfrm>
+          <a:prstGeom prst="rect">
+            <a:avLst/>
+          </a:prstGeom>
+        </p:spPr>
+        <p:txBody>
+          <a:bodyPr vert="horz" lIns="91440" tIns="45720" rIns="91440" bIns="45720" rtlCol="0">
+            <a:normAutofit/>
+          </a:bodyPr>
+          <a:lstStyle/>
+          <a:p>
+            <a:pPr marL="0" marR="0" lvl="0" indent="0" algn="ctr" defTabSz="457200" rtl="0" eaLnBrk="1" fontAlgn="auto" latinLnBrk="0" hangingPunct="1">
+              <a:lnSpc>
+                <a:spcPct val="100000"/>
+              </a:lnSpc>
+              <a:spcBef>
+                <a:spcPct val="20000"/>
+              </a:spcBef>
+              <a:spcAft>
+                <a:spcPts val="0"/>
+              </a:spcAft>
+              <a:buClrTx/>
+              <a:buSzTx/>
+              <a:buFont typeface="Arial"/>
+              <a:buNone/>
+              <a:tabLst/>
+              <a:defRPr/>
+            </a:pPr>
+            <a:r>
+              <a:rPr kumimoji="0" lang="en-US" sz="1800" b="0" i="0" u="none" strike="noStrike" kern="1200" cap="none" spc="0" normalizeH="0" baseline="0" noProof="0" smtClean="0">
+                <a:ln>
+                  <a:noFill/>
+                </a:ln>
+                <a:solidFill>
+                  <a:schemeClr val="tx1"/>
+                </a:solidFill>
+                <a:effectLst/>
+                <a:uLnTx/>
+                <a:uFillTx/>
+                <a:latin typeface="Symbol"/>
+                <a:ea typeface="+mn-ea"/>
+                <a:cs typeface="+mn-cs"/>
+              </a:rPr>
+              <a:t>ε</a:t>
+            </a:r>
+            <a:endParaRPr kumimoji="0" lang="en-US" sz="1800" b="0" i="0" u="none" strike="noStrike" kern="1200" cap="none" spc="0" normalizeH="0" baseline="0" noProof="0" dirty="0" smtClean="0">
+              <a:ln>
+                <a:noFill/>
+              </a:ln>
+              <a:solidFill>
+                <a:schemeClr val="tx1"/>
+              </a:solidFill>
+              <a:effectLst/>
+              <a:uLnTx/>
+              <a:uFillTx/>
+              <a:latin typeface="Symbol"/>
+              <a:ea typeface="+mn-ea"/>
+              <a:cs typeface="+mn-cs"/>
+            </a:endParaRPr>
+          </a:p>
+        </p:txBody>
+      </p:sp>
+      <p:pic>
+        <p:nvPicPr>
+          <p:cNvPr id="23" name="Picture 22" descr="pulse.eps"/>
+          <p:cNvPicPr>
+            <a:picLocks noChangeAspect="1"/>
+          </p:cNvPicPr>
+          <p:nvPr/>
+        </p:nvPicPr>
+        <mc:AlternateContent>
+          <mc:Choice xmlns:ma="http://schemas.microsoft.com/office/mac/drawingml/2008/main" Requires="ma">
+            <p:blipFill>
+              <a:blip r:embed="rId12"/>
+              <a:stretch>
+                <a:fillRect/>
+              </a:stretch>
+            </p:blipFill>
+          </mc:Choice>
+          <mc:Fallback>
+            <p:blipFill>
+              <a:blip r:embed="rId13"/>
+              <a:stretch>
+                <a:fillRect/>
+              </a:stretch>
+            </p:blipFill>
+          </mc:Fallback>
+        </mc:AlternateContent>
+        <p:spPr>
+          <a:xfrm>
+            <a:off x="1238250" y="4385012"/>
+            <a:ext cx="6667500" cy="1320800"/>
+          </a:xfrm>
+          <a:prstGeom prst="rect">
+            <a:avLst/>
+          </a:prstGeom>
+        </p:spPr>
+      </p:pic>
+      <p:sp>
+        <p:nvSpPr>
+          <p:cNvPr id="24" name="TextBox 23"/>
+          <p:cNvSpPr txBox="1"/>
+          <p:nvPr/>
+        </p:nvSpPr>
+        <p:spPr>
+          <a:xfrm>
+            <a:off x="4288412" y="5377715"/>
+            <a:ext cx="300082" cy="369332"/>
+          </a:xfrm>
+          <a:prstGeom prst="rect">
+            <a:avLst/>
+          </a:prstGeom>
+          <a:noFill/>
+        </p:spPr>
+        <p:txBody>
+          <a:bodyPr wrap="none" rtlCol="0">
+            <a:spAutoFit/>
+          </a:bodyPr>
+          <a:lstStyle/>
+          <a:p>
+            <a:r>
+              <a:rPr lang="en-US" dirty="0" smtClean="0">
+                <a:latin typeface="Symbol"/>
+              </a:rPr>
+              <a:t>-</a:t>
+            </a:r>
+            <a:endParaRPr lang="en-US" dirty="0">
               <a:latin typeface="Symbol"/>
             </a:endParaRPr>
           </a:p>

</xml_diff>